<commit_message>
Deployed 2ea8f14 with MkDocs version: 1.5.3
</commit_message>
<xml_diff>
--- a/slides/Unit21_Searching.pptx
+++ b/slides/Unit21_Searching.pptx
@@ -199,7 +199,7 @@
   <pc:docChgLst>
     <pc:chgData name="Zhao Jin" userId="cd05a825-544c-438a-9ba1-08e63db50b47" providerId="ADAL" clId="{C5F7A6A4-0F02-490E-9BE9-6F0ACF176552}"/>
     <pc:docChg chg="undo custSel addSld modSld modMainMaster">
-      <pc:chgData name="Zhao Jin" userId="cd05a825-544c-438a-9ba1-08e63db50b47" providerId="ADAL" clId="{C5F7A6A4-0F02-490E-9BE9-6F0ACF176552}" dt="2024-03-26T01:32:32.465" v="172"/>
+      <pc:chgData name="Zhao Jin" userId="cd05a825-544c-438a-9ba1-08e63db50b47" providerId="ADAL" clId="{C5F7A6A4-0F02-490E-9BE9-6F0ACF176552}" dt="2024-04-02T00:28:12.382" v="178" actId="20577"/>
       <pc:docMkLst>
         <pc:docMk/>
       </pc:docMkLst>
@@ -264,8 +264,8 @@
           </ac:spMkLst>
         </pc:spChg>
       </pc:sldChg>
-      <pc:sldChg chg="modSp">
-        <pc:chgData name="Zhao Jin" userId="cd05a825-544c-438a-9ba1-08e63db50b47" providerId="ADAL" clId="{C5F7A6A4-0F02-490E-9BE9-6F0ACF176552}" dt="2024-03-26T01:32:32.465" v="172"/>
+      <pc:sldChg chg="modSp mod">
+        <pc:chgData name="Zhao Jin" userId="cd05a825-544c-438a-9ba1-08e63db50b47" providerId="ADAL" clId="{C5F7A6A4-0F02-490E-9BE9-6F0ACF176552}" dt="2024-04-02T00:28:12.382" v="178" actId="20577"/>
         <pc:sldMkLst>
           <pc:docMk/>
           <pc:sldMk cId="2970543596" sldId="613"/>
@@ -276,6 +276,14 @@
             <pc:docMk/>
             <pc:sldMk cId="2970543596" sldId="613"/>
             <ac:spMk id="3" creationId="{7F2833D5-B7CC-7537-0E39-2E969509A0F3}"/>
+          </ac:spMkLst>
+        </pc:spChg>
+        <pc:spChg chg="mod">
+          <ac:chgData name="Zhao Jin" userId="cd05a825-544c-438a-9ba1-08e63db50b47" providerId="ADAL" clId="{C5F7A6A4-0F02-490E-9BE9-6F0ACF176552}" dt="2024-04-02T00:28:12.382" v="178" actId="20577"/>
+          <ac:spMkLst>
+            <pc:docMk/>
+            <pc:sldMk cId="2970543596" sldId="613"/>
+            <ac:spMk id="32" creationId="{00000000-0000-0000-0000-000000000000}"/>
           </ac:spMkLst>
         </pc:spChg>
       </pc:sldChg>
@@ -11020,7 +11028,7 @@
               <a:pPr>
                 <a:defRPr/>
               </a:pPr>
-              <a:t>3/26/2024</a:t>
+              <a:t>4/2/2024</a:t>
             </a:fld>
             <a:endParaRPr lang="en-US" dirty="0"/>
           </a:p>
@@ -26258,7 +26266,7 @@
         <p:spPr bwMode="auto">
           <a:xfrm>
             <a:off x="809442" y="1367028"/>
-            <a:ext cx="7159851" cy="2031325"/>
+            <a:ext cx="7159851" cy="2308324"/>
           </a:xfrm>
           <a:prstGeom prst="rect">
             <a:avLst/>
@@ -26665,8 +26673,36 @@
                 <a:latin typeface="Courier New" pitchFamily="49" charset="0"/>
                 <a:cs typeface="Courier New" pitchFamily="49" charset="0"/>
               </a:rPr>
+              <a:t>    }</a:t>
+            </a:r>
+          </a:p>
+          <a:p>
+            <a:pPr>
+              <a:tabLst>
+                <a:tab pos="541338" algn="l"/>
+                <a:tab pos="1073150" algn="l"/>
+                <a:tab pos="1614488" algn="l"/>
+                <a:tab pos="1974850" algn="l"/>
+              </a:tabLst>
+              <a:defRPr/>
+            </a:pPr>
+            <a:r>
+              <a:rPr lang="en-US" b="1">
+                <a:solidFill>
+                  <a:schemeClr val="tx1"/>
+                </a:solidFill>
+                <a:latin typeface="Courier New" pitchFamily="49" charset="0"/>
+                <a:cs typeface="Courier New" pitchFamily="49" charset="0"/>
+              </a:rPr>
               <a:t>  }</a:t>
             </a:r>
+            <a:endParaRPr lang="en-US" b="1" dirty="0">
+              <a:solidFill>
+                <a:schemeClr val="tx1"/>
+              </a:solidFill>
+              <a:latin typeface="Courier New" pitchFamily="49" charset="0"/>
+              <a:cs typeface="Courier New" pitchFamily="49" charset="0"/>
+            </a:endParaRPr>
           </a:p>
           <a:p>
             <a:pPr>

</xml_diff>